<commit_message>
Latest changes to Fsharp Presentations
</commit_message>
<xml_diff>
--- a/Presentation2/slides/IntroToFSharpPart2.pptx
+++ b/Presentation2/slides/IntroToFSharpPart2.pptx
@@ -8,10 +8,6 @@
     <p:sldId id="256" r:id="rId2"/>
     <p:sldId id="257" r:id="rId3"/>
     <p:sldId id="258" r:id="rId4"/>
-    <p:sldId id="259" r:id="rId5"/>
-    <p:sldId id="262" r:id="rId6"/>
-    <p:sldId id="260" r:id="rId7"/>
-    <p:sldId id="261" r:id="rId8"/>
   </p:sldIdLst>
   <p:sldSz cx="12192000" cy="6858000"/>
   <p:notesSz cx="6858000" cy="9144000"/>
@@ -110,6 +106,11 @@
       </a:defRPr>
     </a:lvl9pPr>
   </p:defaultTextStyle>
+  <p:extLst>
+    <p:ext uri="{EFAFB233-063F-42B5-8137-9DF3F51BA10A}">
+      <p15:sldGuideLst xmlns:p15="http://schemas.microsoft.com/office/powerpoint/2012/main"/>
+    </p:ext>
+  </p:extLst>
 </p:presentation>
 </file>
 
@@ -283,7 +284,7 @@
           <a:p>
             <a:fld id="{A27AF75C-B8C7-4818-A282-F06E43BC9FBD}" type="datetimeFigureOut">
               <a:rPr lang="en-US" smtClean="0"/>
-              <a:t>1/26/2015</a:t>
+              <a:t>1/27/2015</a:t>
             </a:fld>
             <a:endParaRPr lang="en-US"/>
           </a:p>
@@ -550,7 +551,7 @@
           <a:p>
             <a:fld id="{A27AF75C-B8C7-4818-A282-F06E43BC9FBD}" type="datetimeFigureOut">
               <a:rPr lang="en-US" smtClean="0"/>
-              <a:t>1/26/2015</a:t>
+              <a:t>1/27/2015</a:t>
             </a:fld>
             <a:endParaRPr lang="en-US"/>
           </a:p>
@@ -781,7 +782,7 @@
           <a:p>
             <a:fld id="{A27AF75C-B8C7-4818-A282-F06E43BC9FBD}" type="datetimeFigureOut">
               <a:rPr lang="en-US" smtClean="0"/>
-              <a:t>1/26/2015</a:t>
+              <a:t>1/27/2015</a:t>
             </a:fld>
             <a:endParaRPr lang="en-US"/>
           </a:p>
@@ -1091,7 +1092,7 @@
           <a:p>
             <a:fld id="{A27AF75C-B8C7-4818-A282-F06E43BC9FBD}" type="datetimeFigureOut">
               <a:rPr lang="en-US" smtClean="0"/>
-              <a:t>1/26/2015</a:t>
+              <a:t>1/27/2015</a:t>
             </a:fld>
             <a:endParaRPr lang="en-US"/>
           </a:p>
@@ -1564,7 +1565,7 @@
           <a:p>
             <a:fld id="{A27AF75C-B8C7-4818-A282-F06E43BC9FBD}" type="datetimeFigureOut">
               <a:rPr lang="en-US" smtClean="0"/>
-              <a:t>1/26/2015</a:t>
+              <a:t>1/27/2015</a:t>
             </a:fld>
             <a:endParaRPr lang="en-US"/>
           </a:p>
@@ -2111,7 +2112,7 @@
           <a:p>
             <a:fld id="{A27AF75C-B8C7-4818-A282-F06E43BC9FBD}" type="datetimeFigureOut">
               <a:rPr lang="en-US" smtClean="0"/>
-              <a:t>1/26/2015</a:t>
+              <a:t>1/27/2015</a:t>
             </a:fld>
             <a:endParaRPr lang="en-US"/>
           </a:p>
@@ -2885,7 +2886,7 @@
           <a:p>
             <a:fld id="{A27AF75C-B8C7-4818-A282-F06E43BC9FBD}" type="datetimeFigureOut">
               <a:rPr lang="en-US" smtClean="0"/>
-              <a:t>1/26/2015</a:t>
+              <a:t>1/27/2015</a:t>
             </a:fld>
             <a:endParaRPr lang="en-US"/>
           </a:p>
@@ -3060,7 +3061,7 @@
           <a:p>
             <a:fld id="{A27AF75C-B8C7-4818-A282-F06E43BC9FBD}" type="datetimeFigureOut">
               <a:rPr lang="en-US" smtClean="0"/>
-              <a:t>1/26/2015</a:t>
+              <a:t>1/27/2015</a:t>
             </a:fld>
             <a:endParaRPr lang="en-US"/>
           </a:p>
@@ -3283,7 +3284,7 @@
           <a:p>
             <a:fld id="{A27AF75C-B8C7-4818-A282-F06E43BC9FBD}" type="datetimeFigureOut">
               <a:rPr lang="en-US" smtClean="0"/>
-              <a:t>1/26/2015</a:t>
+              <a:t>1/27/2015</a:t>
             </a:fld>
             <a:endParaRPr lang="en-US"/>
           </a:p>
@@ -3463,7 +3464,7 @@
           <a:p>
             <a:fld id="{A27AF75C-B8C7-4818-A282-F06E43BC9FBD}" type="datetimeFigureOut">
               <a:rPr lang="en-US" smtClean="0"/>
-              <a:t>1/26/2015</a:t>
+              <a:t>1/27/2015</a:t>
             </a:fld>
             <a:endParaRPr lang="en-US"/>
           </a:p>
@@ -3752,7 +3753,7 @@
           <a:p>
             <a:fld id="{A27AF75C-B8C7-4818-A282-F06E43BC9FBD}" type="datetimeFigureOut">
               <a:rPr lang="en-US" smtClean="0"/>
-              <a:t>1/26/2015</a:t>
+              <a:t>1/27/2015</a:t>
             </a:fld>
             <a:endParaRPr lang="en-US"/>
           </a:p>
@@ -3994,7 +3995,7 @@
           <a:p>
             <a:fld id="{A27AF75C-B8C7-4818-A282-F06E43BC9FBD}" type="datetimeFigureOut">
               <a:rPr lang="en-US" smtClean="0"/>
-              <a:t>1/26/2015</a:t>
+              <a:t>1/27/2015</a:t>
             </a:fld>
             <a:endParaRPr lang="en-US"/>
           </a:p>
@@ -4373,7 +4374,7 @@
           <a:p>
             <a:fld id="{A27AF75C-B8C7-4818-A282-F06E43BC9FBD}" type="datetimeFigureOut">
               <a:rPr lang="en-US" smtClean="0"/>
-              <a:t>1/26/2015</a:t>
+              <a:t>1/27/2015</a:t>
             </a:fld>
             <a:endParaRPr lang="en-US"/>
           </a:p>
@@ -4491,7 +4492,7 @@
           <a:p>
             <a:fld id="{A27AF75C-B8C7-4818-A282-F06E43BC9FBD}" type="datetimeFigureOut">
               <a:rPr lang="en-US" smtClean="0"/>
-              <a:t>1/26/2015</a:t>
+              <a:t>1/27/2015</a:t>
             </a:fld>
             <a:endParaRPr lang="en-US"/>
           </a:p>
@@ -4586,7 +4587,7 @@
           <a:p>
             <a:fld id="{A27AF75C-B8C7-4818-A282-F06E43BC9FBD}" type="datetimeFigureOut">
               <a:rPr lang="en-US" smtClean="0"/>
-              <a:t>1/26/2015</a:t>
+              <a:t>1/27/2015</a:t>
             </a:fld>
             <a:endParaRPr lang="en-US"/>
           </a:p>
@@ -4835,7 +4836,7 @@
           <a:p>
             <a:fld id="{A27AF75C-B8C7-4818-A282-F06E43BC9FBD}" type="datetimeFigureOut">
               <a:rPr lang="en-US" smtClean="0"/>
-              <a:t>1/26/2015</a:t>
+              <a:t>1/27/2015</a:t>
             </a:fld>
             <a:endParaRPr lang="en-US"/>
           </a:p>
@@ -5092,7 +5093,7 @@
           <a:p>
             <a:fld id="{A27AF75C-B8C7-4818-A282-F06E43BC9FBD}" type="datetimeFigureOut">
               <a:rPr lang="en-US" smtClean="0"/>
-              <a:t>1/26/2015</a:t>
+              <a:t>1/27/2015</a:t>
             </a:fld>
             <a:endParaRPr lang="en-US"/>
           </a:p>
@@ -5335,7 +5336,7 @@
           <a:p>
             <a:fld id="{A27AF75C-B8C7-4818-A282-F06E43BC9FBD}" type="datetimeFigureOut">
               <a:rPr lang="en-US" smtClean="0"/>
-              <a:t>1/26/2015</a:t>
+              <a:t>1/27/2015</a:t>
             </a:fld>
             <a:endParaRPr lang="en-US"/>
           </a:p>
@@ -5786,7 +5787,11 @@
           <a:p>
             <a:r>
               <a:rPr lang="en-US" dirty="0" smtClean="0"/>
-              <a:t>Part 2 – Computation Expressions, Testing, Scripting</a:t>
+              <a:t>Part 2 – </a:t>
+            </a:r>
+            <a:r>
+              <a:rPr lang="en-US" dirty="0" smtClean="0"/>
+              <a:t>Expressions, Pattern Matching, Sequences and List comprehensions</a:t>
             </a:r>
             <a:endParaRPr lang="en-US" dirty="0"/>
           </a:p>
@@ -5972,19 +5977,27 @@
           <a:p>
             <a:r>
               <a:rPr lang="en-US" dirty="0" smtClean="0"/>
-              <a:t>Code Quotations</a:t>
+              <a:t>Expressions versus Statements</a:t>
             </a:r>
           </a:p>
           <a:p>
             <a:r>
               <a:rPr lang="en-US" dirty="0" smtClean="0"/>
-              <a:t>Computation Expressions</a:t>
-            </a:r>
+              <a:t>Pattern Matching</a:t>
+            </a:r>
+            <a:endParaRPr lang="en-US" dirty="0" smtClean="0"/>
           </a:p>
           <a:p>
             <a:r>
               <a:rPr lang="en-US" dirty="0" smtClean="0"/>
-              <a:t>Advanced Testing Techniques - FsCheck</a:t>
+              <a:t>Sequences</a:t>
+            </a:r>
+            <a:endParaRPr lang="en-US" dirty="0" smtClean="0"/>
+          </a:p>
+          <a:p>
+            <a:r>
+              <a:rPr lang="en-US" dirty="0" smtClean="0"/>
+              <a:t>List Comprehensions</a:t>
             </a:r>
             <a:endParaRPr lang="en-US" dirty="0"/>
           </a:p>
@@ -5994,398 +6007,6 @@
     <p:extLst>
       <p:ext uri="{BB962C8B-B14F-4D97-AF65-F5344CB8AC3E}">
         <p14:creationId xmlns:p14="http://schemas.microsoft.com/office/powerpoint/2010/main" val="257138445"/>
-      </p:ext>
-    </p:extLst>
-  </p:cSld>
-  <p:clrMapOvr>
-    <a:masterClrMapping/>
-  </p:clrMapOvr>
-</p:sld>
-</file>
-
-<file path=ppt/slides/slide4.xml><?xml version="1.0" encoding="utf-8"?>
-<p:sld xmlns:a="http://schemas.openxmlformats.org/drawingml/2006/main" xmlns:r="http://schemas.openxmlformats.org/officeDocument/2006/relationships" xmlns:p="http://schemas.openxmlformats.org/presentationml/2006/main">
-  <p:cSld>
-    <p:spTree>
-      <p:nvGrpSpPr>
-        <p:cNvPr id="1" name=""/>
-        <p:cNvGrpSpPr/>
-        <p:nvPr/>
-      </p:nvGrpSpPr>
-      <p:grpSpPr>
-        <a:xfrm>
-          <a:off x="0" y="0"/>
-          <a:ext cx="0" cy="0"/>
-          <a:chOff x="0" y="0"/>
-          <a:chExt cx="0" cy="0"/>
-        </a:xfrm>
-      </p:grpSpPr>
-      <p:sp>
-        <p:nvSpPr>
-          <p:cNvPr id="2" name="Title 1"/>
-          <p:cNvSpPr>
-            <a:spLocks noGrp="1"/>
-          </p:cNvSpPr>
-          <p:nvPr>
-            <p:ph type="title"/>
-          </p:nvPr>
-        </p:nvSpPr>
-        <p:spPr/>
-        <p:txBody>
-          <a:bodyPr/>
-          <a:lstStyle/>
-          <a:p>
-            <a:r>
-              <a:rPr lang="en-US" dirty="0" smtClean="0"/>
-              <a:t>Code Quotations</a:t>
-            </a:r>
-            <a:endParaRPr lang="en-US" dirty="0"/>
-          </a:p>
-        </p:txBody>
-      </p:sp>
-      <p:sp>
-        <p:nvSpPr>
-          <p:cNvPr id="3" name="Content Placeholder 2"/>
-          <p:cNvSpPr>
-            <a:spLocks noGrp="1"/>
-          </p:cNvSpPr>
-          <p:nvPr>
-            <p:ph idx="1"/>
-          </p:nvPr>
-        </p:nvSpPr>
-        <p:spPr/>
-        <p:txBody>
-          <a:bodyPr/>
-          <a:lstStyle/>
-          <a:p>
-            <a:r>
-              <a:rPr lang="en-US" dirty="0" smtClean="0"/>
-              <a:t>Code Quotations implement meta-programming on F# AST trees</a:t>
-            </a:r>
-          </a:p>
-          <a:p>
-            <a:r>
-              <a:rPr lang="en-US" dirty="0" smtClean="0"/>
-              <a:t>Used to translate F# Code on the fly into ‘Cuda’, ‘JavaScript’ etc.</a:t>
-            </a:r>
-          </a:p>
-          <a:p>
-            <a:r>
-              <a:rPr lang="en-US" dirty="0" smtClean="0"/>
-              <a:t>Used to do Code Analysis</a:t>
-            </a:r>
-          </a:p>
-          <a:p>
-            <a:r>
-              <a:rPr lang="en-US" dirty="0" smtClean="0"/>
-              <a:t>C# 3.0 expression tree type is modeled on F# Quotations</a:t>
-            </a:r>
-          </a:p>
-          <a:p>
-            <a:r>
-              <a:rPr lang="en-US" dirty="0" smtClean="0"/>
-              <a:t>Example using Unicode - « 1 + ¾ »</a:t>
-            </a:r>
-          </a:p>
-          <a:p>
-            <a:r>
-              <a:rPr lang="en-US" dirty="0" smtClean="0"/>
-              <a:t>Example using Ascii - &lt;@ 1 + ¾ @&gt;</a:t>
-            </a:r>
-          </a:p>
-          <a:p>
-            <a:pPr marL="228600" lvl="1">
-              <a:spcBef>
-                <a:spcPts val="1000"/>
-              </a:spcBef>
-            </a:pPr>
-            <a:r>
-              <a:rPr lang="en-US" dirty="0" smtClean="0"/>
-              <a:t>Any code block using attribute   </a:t>
-            </a:r>
-            <a:r>
-              <a:rPr lang="en-US" dirty="0"/>
-              <a:t>[&lt;</a:t>
-            </a:r>
-            <a:r>
-              <a:rPr lang="en-US" dirty="0" smtClean="0"/>
-              <a:t>ReflectedDefinition&gt;] can be accessed later in code as an AST tree</a:t>
-            </a:r>
-            <a:endParaRPr lang="en-US" dirty="0"/>
-          </a:p>
-          <a:p>
-            <a:endParaRPr lang="en-US" dirty="0" smtClean="0"/>
-          </a:p>
-          <a:p>
-            <a:endParaRPr lang="en-US" dirty="0"/>
-          </a:p>
-        </p:txBody>
-      </p:sp>
-    </p:spTree>
-    <p:extLst>
-      <p:ext uri="{BB962C8B-B14F-4D97-AF65-F5344CB8AC3E}">
-        <p14:creationId xmlns:p14="http://schemas.microsoft.com/office/powerpoint/2010/main" val="2497797472"/>
-      </p:ext>
-    </p:extLst>
-  </p:cSld>
-  <p:clrMapOvr>
-    <a:masterClrMapping/>
-  </p:clrMapOvr>
-</p:sld>
-</file>
-
-<file path=ppt/slides/slide5.xml><?xml version="1.0" encoding="utf-8"?>
-<p:sld xmlns:a="http://schemas.openxmlformats.org/drawingml/2006/main" xmlns:r="http://schemas.openxmlformats.org/officeDocument/2006/relationships" xmlns:p="http://schemas.openxmlformats.org/presentationml/2006/main">
-  <p:cSld>
-    <p:spTree>
-      <p:nvGrpSpPr>
-        <p:cNvPr id="1" name=""/>
-        <p:cNvGrpSpPr/>
-        <p:nvPr/>
-      </p:nvGrpSpPr>
-      <p:grpSpPr>
-        <a:xfrm>
-          <a:off x="0" y="0"/>
-          <a:ext cx="0" cy="0"/>
-          <a:chOff x="0" y="0"/>
-          <a:chExt cx="0" cy="0"/>
-        </a:xfrm>
-      </p:grpSpPr>
-      <p:sp>
-        <p:nvSpPr>
-          <p:cNvPr id="2" name="Title 1"/>
-          <p:cNvSpPr>
-            <a:spLocks noGrp="1"/>
-          </p:cNvSpPr>
-          <p:nvPr>
-            <p:ph type="title"/>
-          </p:nvPr>
-        </p:nvSpPr>
-        <p:spPr/>
-        <p:txBody>
-          <a:bodyPr/>
-          <a:lstStyle/>
-          <a:p>
-            <a:r>
-              <a:rPr lang="en-US" dirty="0" smtClean="0"/>
-              <a:t>Code Quotations</a:t>
-            </a:r>
-            <a:endParaRPr lang="en-US" dirty="0"/>
-          </a:p>
-        </p:txBody>
-      </p:sp>
-      <p:sp>
-        <p:nvSpPr>
-          <p:cNvPr id="3" name="Content Placeholder 2"/>
-          <p:cNvSpPr>
-            <a:spLocks noGrp="1"/>
-          </p:cNvSpPr>
-          <p:nvPr>
-            <p:ph idx="1"/>
-          </p:nvPr>
-        </p:nvSpPr>
-        <p:spPr/>
-        <p:txBody>
-          <a:bodyPr/>
-          <a:lstStyle/>
-          <a:p>
-            <a:r>
-              <a:rPr lang="en-US" dirty="0" smtClean="0"/>
-              <a:t>Limitations</a:t>
-            </a:r>
-          </a:p>
-          <a:p>
-            <a:pPr lvl="1"/>
-            <a:r>
-              <a:rPr lang="en-US" dirty="0" smtClean="0"/>
-              <a:t>Does not support throw and catch</a:t>
-            </a:r>
-          </a:p>
-          <a:p>
-            <a:pPr lvl="1"/>
-            <a:r>
-              <a:rPr lang="en-US" dirty="0" smtClean="0"/>
-              <a:t>Does not support open generics</a:t>
-            </a:r>
-          </a:p>
-          <a:p>
-            <a:r>
-              <a:rPr lang="en-US" dirty="0" smtClean="0"/>
-              <a:t>Advantages over C# 4.0 Expressions</a:t>
-            </a:r>
-          </a:p>
-          <a:p>
-            <a:pPr lvl="1"/>
-            <a:r>
-              <a:rPr lang="en-US" dirty="0" smtClean="0"/>
-              <a:t>Includes Closures</a:t>
-            </a:r>
-          </a:p>
-          <a:p>
-            <a:pPr lvl="1"/>
-            <a:r>
-              <a:rPr lang="en-US" dirty="0" smtClean="0"/>
-              <a:t>Allows splicing of </a:t>
-            </a:r>
-            <a:r>
-              <a:rPr lang="en-US" smtClean="0"/>
-              <a:t>treesy</a:t>
-            </a:r>
-            <a:endParaRPr lang="en-US"/>
-          </a:p>
-          <a:p>
-            <a:endParaRPr lang="en-US" dirty="0"/>
-          </a:p>
-        </p:txBody>
-      </p:sp>
-    </p:spTree>
-    <p:extLst>
-      <p:ext uri="{BB962C8B-B14F-4D97-AF65-F5344CB8AC3E}">
-        <p14:creationId xmlns:p14="http://schemas.microsoft.com/office/powerpoint/2010/main" val="2006921816"/>
-      </p:ext>
-    </p:extLst>
-  </p:cSld>
-  <p:clrMapOvr>
-    <a:masterClrMapping/>
-  </p:clrMapOvr>
-</p:sld>
-</file>
-
-<file path=ppt/slides/slide6.xml><?xml version="1.0" encoding="utf-8"?>
-<p:sld xmlns:a="http://schemas.openxmlformats.org/drawingml/2006/main" xmlns:r="http://schemas.openxmlformats.org/officeDocument/2006/relationships" xmlns:p="http://schemas.openxmlformats.org/presentationml/2006/main">
-  <p:cSld>
-    <p:spTree>
-      <p:nvGrpSpPr>
-        <p:cNvPr id="1" name=""/>
-        <p:cNvGrpSpPr/>
-        <p:nvPr/>
-      </p:nvGrpSpPr>
-      <p:grpSpPr>
-        <a:xfrm>
-          <a:off x="0" y="0"/>
-          <a:ext cx="0" cy="0"/>
-          <a:chOff x="0" y="0"/>
-          <a:chExt cx="0" cy="0"/>
-        </a:xfrm>
-      </p:grpSpPr>
-      <p:sp>
-        <p:nvSpPr>
-          <p:cNvPr id="2" name="Title 1"/>
-          <p:cNvSpPr>
-            <a:spLocks noGrp="1"/>
-          </p:cNvSpPr>
-          <p:nvPr>
-            <p:ph type="title"/>
-          </p:nvPr>
-        </p:nvSpPr>
-        <p:spPr/>
-        <p:txBody>
-          <a:bodyPr/>
-          <a:lstStyle/>
-          <a:p>
-            <a:r>
-              <a:rPr lang="en-US" dirty="0" smtClean="0"/>
-              <a:t>Computation Expressions</a:t>
-            </a:r>
-            <a:endParaRPr lang="en-US" dirty="0"/>
-          </a:p>
-        </p:txBody>
-      </p:sp>
-      <p:sp>
-        <p:nvSpPr>
-          <p:cNvPr id="3" name="Content Placeholder 2"/>
-          <p:cNvSpPr>
-            <a:spLocks noGrp="1"/>
-          </p:cNvSpPr>
-          <p:nvPr>
-            <p:ph idx="1"/>
-          </p:nvPr>
-        </p:nvSpPr>
-        <p:spPr/>
-        <p:txBody>
-          <a:bodyPr/>
-          <a:lstStyle/>
-          <a:p>
-            <a:endParaRPr lang="en-US" dirty="0"/>
-          </a:p>
-        </p:txBody>
-      </p:sp>
-    </p:spTree>
-    <p:extLst>
-      <p:ext uri="{BB962C8B-B14F-4D97-AF65-F5344CB8AC3E}">
-        <p14:creationId xmlns:p14="http://schemas.microsoft.com/office/powerpoint/2010/main" val="2043967236"/>
-      </p:ext>
-    </p:extLst>
-  </p:cSld>
-  <p:clrMapOvr>
-    <a:masterClrMapping/>
-  </p:clrMapOvr>
-</p:sld>
-</file>
-
-<file path=ppt/slides/slide7.xml><?xml version="1.0" encoding="utf-8"?>
-<p:sld xmlns:a="http://schemas.openxmlformats.org/drawingml/2006/main" xmlns:r="http://schemas.openxmlformats.org/officeDocument/2006/relationships" xmlns:p="http://schemas.openxmlformats.org/presentationml/2006/main">
-  <p:cSld>
-    <p:spTree>
-      <p:nvGrpSpPr>
-        <p:cNvPr id="1" name=""/>
-        <p:cNvGrpSpPr/>
-        <p:nvPr/>
-      </p:nvGrpSpPr>
-      <p:grpSpPr>
-        <a:xfrm>
-          <a:off x="0" y="0"/>
-          <a:ext cx="0" cy="0"/>
-          <a:chOff x="0" y="0"/>
-          <a:chExt cx="0" cy="0"/>
-        </a:xfrm>
-      </p:grpSpPr>
-      <p:sp>
-        <p:nvSpPr>
-          <p:cNvPr id="2" name="Title 1"/>
-          <p:cNvSpPr>
-            <a:spLocks noGrp="1"/>
-          </p:cNvSpPr>
-          <p:nvPr>
-            <p:ph type="title"/>
-          </p:nvPr>
-        </p:nvSpPr>
-        <p:spPr/>
-        <p:txBody>
-          <a:bodyPr/>
-          <a:lstStyle/>
-          <a:p>
-            <a:r>
-              <a:rPr lang="en-US" dirty="0" smtClean="0"/>
-              <a:t>Advanced Testing - FsCheck</a:t>
-            </a:r>
-            <a:endParaRPr lang="en-US" dirty="0"/>
-          </a:p>
-        </p:txBody>
-      </p:sp>
-      <p:sp>
-        <p:nvSpPr>
-          <p:cNvPr id="3" name="Content Placeholder 2"/>
-          <p:cNvSpPr>
-            <a:spLocks noGrp="1"/>
-          </p:cNvSpPr>
-          <p:nvPr>
-            <p:ph idx="1"/>
-          </p:nvPr>
-        </p:nvSpPr>
-        <p:spPr/>
-        <p:txBody>
-          <a:bodyPr/>
-          <a:lstStyle/>
-          <a:p>
-            <a:endParaRPr lang="en-US" dirty="0"/>
-          </a:p>
-        </p:txBody>
-      </p:sp>
-    </p:spTree>
-    <p:extLst>
-      <p:ext uri="{BB962C8B-B14F-4D97-AF65-F5344CB8AC3E}">
-        <p14:creationId xmlns:p14="http://schemas.microsoft.com/office/powerpoint/2010/main" val="2809248677"/>
       </p:ext>
     </p:extLst>
   </p:cSld>

</xml_diff>